<commit_message>
proposed improvements to project plan
</commit_message>
<xml_diff>
--- a/project/DW_MultipleCloud.pptx
+++ b/project/DW_MultipleCloud.pptx
@@ -198,7 +198,7 @@
           <a:p>
             <a:fld id="{648AA062-3054-46AA-90AA-5B9100332113}" type="datetimeFigureOut">
               <a:rPr lang="en-US" smtClean="0"/>
-              <a:t>11/18/2019</a:t>
+              <a:t>12/3/19</a:t>
             </a:fld>
             <a:endParaRPr lang="en-US"/>
           </a:p>
@@ -612,7 +612,7 @@
           <a:p>
             <a:fld id="{E8E545E7-AC34-4101-9A44-91ADD2495751}" type="datetimeFigureOut">
               <a:rPr lang="en-US" smtClean="0"/>
-              <a:t>11/18/2019</a:t>
+              <a:t>12/3/19</a:t>
             </a:fld>
             <a:endParaRPr lang="en-US"/>
           </a:p>
@@ -810,7 +810,7 @@
           <a:p>
             <a:fld id="{E8E545E7-AC34-4101-9A44-91ADD2495751}" type="datetimeFigureOut">
               <a:rPr lang="en-US" smtClean="0"/>
-              <a:t>11/18/2019</a:t>
+              <a:t>12/3/19</a:t>
             </a:fld>
             <a:endParaRPr lang="en-US"/>
           </a:p>
@@ -1018,7 +1018,7 @@
           <a:p>
             <a:fld id="{E8E545E7-AC34-4101-9A44-91ADD2495751}" type="datetimeFigureOut">
               <a:rPr lang="en-US" smtClean="0"/>
-              <a:t>11/18/2019</a:t>
+              <a:t>12/3/19</a:t>
             </a:fld>
             <a:endParaRPr lang="en-US"/>
           </a:p>
@@ -1216,7 +1216,7 @@
           <a:p>
             <a:fld id="{E8E545E7-AC34-4101-9A44-91ADD2495751}" type="datetimeFigureOut">
               <a:rPr lang="en-US" smtClean="0"/>
-              <a:t>11/18/2019</a:t>
+              <a:t>12/3/19</a:t>
             </a:fld>
             <a:endParaRPr lang="en-US"/>
           </a:p>
@@ -1491,7 +1491,7 @@
           <a:p>
             <a:fld id="{E8E545E7-AC34-4101-9A44-91ADD2495751}" type="datetimeFigureOut">
               <a:rPr lang="en-US" smtClean="0"/>
-              <a:t>11/18/2019</a:t>
+              <a:t>12/3/19</a:t>
             </a:fld>
             <a:endParaRPr lang="en-US"/>
           </a:p>
@@ -1756,7 +1756,7 @@
           <a:p>
             <a:fld id="{E8E545E7-AC34-4101-9A44-91ADD2495751}" type="datetimeFigureOut">
               <a:rPr lang="en-US" smtClean="0"/>
-              <a:t>11/18/2019</a:t>
+              <a:t>12/3/19</a:t>
             </a:fld>
             <a:endParaRPr lang="en-US"/>
           </a:p>
@@ -2168,7 +2168,7 @@
           <a:p>
             <a:fld id="{E8E545E7-AC34-4101-9A44-91ADD2495751}" type="datetimeFigureOut">
               <a:rPr lang="en-US" smtClean="0"/>
-              <a:t>11/18/2019</a:t>
+              <a:t>12/3/19</a:t>
             </a:fld>
             <a:endParaRPr lang="en-US"/>
           </a:p>
@@ -2309,7 +2309,7 @@
           <a:p>
             <a:fld id="{E8E545E7-AC34-4101-9A44-91ADD2495751}" type="datetimeFigureOut">
               <a:rPr lang="en-US" smtClean="0"/>
-              <a:t>11/18/2019</a:t>
+              <a:t>12/3/19</a:t>
             </a:fld>
             <a:endParaRPr lang="en-US"/>
           </a:p>
@@ -2422,7 +2422,7 @@
           <a:p>
             <a:fld id="{E8E545E7-AC34-4101-9A44-91ADD2495751}" type="datetimeFigureOut">
               <a:rPr lang="en-US" smtClean="0"/>
-              <a:t>11/18/2019</a:t>
+              <a:t>12/3/19</a:t>
             </a:fld>
             <a:endParaRPr lang="en-US"/>
           </a:p>
@@ -2733,7 +2733,7 @@
           <a:p>
             <a:fld id="{E8E545E7-AC34-4101-9A44-91ADD2495751}" type="datetimeFigureOut">
               <a:rPr lang="en-US" smtClean="0"/>
-              <a:t>11/18/2019</a:t>
+              <a:t>12/3/19</a:t>
             </a:fld>
             <a:endParaRPr lang="en-US"/>
           </a:p>
@@ -3021,7 +3021,7 @@
           <a:p>
             <a:fld id="{E8E545E7-AC34-4101-9A44-91ADD2495751}" type="datetimeFigureOut">
               <a:rPr lang="en-US" smtClean="0"/>
-              <a:t>11/18/2019</a:t>
+              <a:t>12/3/19</a:t>
             </a:fld>
             <a:endParaRPr lang="en-US"/>
           </a:p>
@@ -3262,7 +3262,7 @@
           <a:p>
             <a:fld id="{E8E545E7-AC34-4101-9A44-91ADD2495751}" type="datetimeFigureOut">
               <a:rPr lang="en-US" smtClean="0"/>
-              <a:t>11/18/2019</a:t>
+              <a:t>12/3/19</a:t>
             </a:fld>
             <a:endParaRPr lang="en-US"/>
           </a:p>
@@ -4224,7 +4224,7 @@
         </p:blipFill>
         <p:spPr>
           <a:xfrm>
-            <a:off x="678772" y="1371033"/>
+            <a:off x="698333" y="2516751"/>
             <a:ext cx="2235595" cy="1277484"/>
           </a:xfrm>
           <a:prstGeom prst="rect">
@@ -4276,8 +4276,8 @@
         </p:nvGrpSpPr>
         <p:grpSpPr>
           <a:xfrm>
-            <a:off x="4288746" y="1371033"/>
-            <a:ext cx="3371850" cy="4229667"/>
+            <a:off x="4288746" y="2526276"/>
+            <a:ext cx="3371850" cy="3074424"/>
             <a:chOff x="3782719" y="1314166"/>
             <a:chExt cx="3371850" cy="4229667"/>
           </a:xfrm>
@@ -4382,8 +4382,8 @@
           </p:nvSpPr>
           <p:spPr>
             <a:xfrm>
-              <a:off x="3919492" y="3123470"/>
-              <a:ext cx="1491448" cy="559293"/>
+              <a:off x="3918590" y="2728303"/>
+              <a:ext cx="1491448" cy="1401391"/>
             </a:xfrm>
             <a:prstGeom prst="roundRect">
               <a:avLst/>
@@ -4429,8 +4429,8 @@
           </p:nvSpPr>
           <p:spPr>
             <a:xfrm>
-              <a:off x="5528152" y="3098626"/>
-              <a:ext cx="1491448" cy="559293"/>
+              <a:off x="5527250" y="2703460"/>
+              <a:ext cx="1491448" cy="1401391"/>
             </a:xfrm>
             <a:prstGeom prst="roundRect">
               <a:avLst/>
@@ -4473,15 +4473,15 @@
             </a:extLst>
           </p:cNvPr>
           <p:cNvCxnSpPr>
+            <a:cxnSpLocks/>
             <a:stCxn id="6" idx="3"/>
-            <a:endCxn id="8" idx="1"/>
           </p:cNvCxnSpPr>
           <p:nvPr/>
         </p:nvCxnSpPr>
         <p:spPr>
           <a:xfrm>
-            <a:off x="2914367" y="2009775"/>
-            <a:ext cx="1374379" cy="1476092"/>
+            <a:off x="2933928" y="3155493"/>
+            <a:ext cx="1374379" cy="9525"/>
           </a:xfrm>
           <a:prstGeom prst="straightConnector1">
             <a:avLst/>
@@ -4517,14 +4517,13 @@
           <p:cNvCxnSpPr>
             <a:cxnSpLocks/>
             <a:stCxn id="7" idx="3"/>
-            <a:endCxn id="8" idx="1"/>
           </p:cNvCxnSpPr>
           <p:nvPr/>
         </p:nvCxnSpPr>
         <p:spPr>
-          <a:xfrm flipV="1">
-            <a:off x="3167062" y="3485867"/>
-            <a:ext cx="1121684" cy="1352833"/>
+          <a:xfrm>
+            <a:off x="3167062" y="4838700"/>
+            <a:ext cx="1121684" cy="0"/>
           </a:xfrm>
           <a:prstGeom prst="straightConnector1">
             <a:avLst/>
@@ -4560,13 +4559,14 @@
           <p:cNvCxnSpPr>
             <a:cxnSpLocks/>
             <a:stCxn id="8" idx="3"/>
+            <a:endCxn id="2" idx="1"/>
           </p:cNvCxnSpPr>
           <p:nvPr/>
         </p:nvCxnSpPr>
         <p:spPr>
-          <a:xfrm>
-            <a:off x="7660596" y="3485867"/>
-            <a:ext cx="1374374" cy="0"/>
+          <a:xfrm flipV="1">
+            <a:off x="7660596" y="4026616"/>
+            <a:ext cx="1473836" cy="36872"/>
           </a:xfrm>
           <a:prstGeom prst="straightConnector1">
             <a:avLst/>
@@ -4612,7 +4612,7 @@
         </p:blipFill>
         <p:spPr>
           <a:xfrm>
-            <a:off x="9049766" y="2747821"/>
+            <a:off x="9134432" y="3288218"/>
             <a:ext cx="1763045" cy="1476795"/>
           </a:xfrm>
           <a:prstGeom prst="rect">

</xml_diff>